<commit_message>
modif des sliades + ajout d'un fichier tronqué
</commit_message>
<xml_diff>
--- a/presentationia.pptx
+++ b/presentationia.pptx
@@ -6,15 +6,17 @@
     <p:sldMasterId id="2147484148" r:id="rId2"/>
   </p:sldMasterIdLst>
   <p:notesMasterIdLst>
-    <p:notesMasterId r:id="rId9"/>
+    <p:notesMasterId r:id="rId11"/>
   </p:notesMasterIdLst>
   <p:sldIdLst>
     <p:sldId id="256" r:id="rId3"/>
     <p:sldId id="257" r:id="rId4"/>
     <p:sldId id="258" r:id="rId5"/>
     <p:sldId id="259" r:id="rId6"/>
-    <p:sldId id="260" r:id="rId7"/>
-    <p:sldId id="261" r:id="rId8"/>
+    <p:sldId id="262" r:id="rId7"/>
+    <p:sldId id="263" r:id="rId8"/>
+    <p:sldId id="260" r:id="rId9"/>
+    <p:sldId id="261" r:id="rId10"/>
   </p:sldIdLst>
   <p:sldSz cx="12192000" cy="6858000"/>
   <p:notesSz cx="6858000" cy="9144000"/>
@@ -113,6 +115,11 @@
       </a:defRPr>
     </a:lvl9pPr>
   </p:defaultTextStyle>
+  <p:extLst>
+    <p:ext uri="{EFAFB233-063F-42B5-8137-9DF3F51BA10A}">
+      <p15:sldGuideLst xmlns:p15="http://schemas.microsoft.com/office/powerpoint/2012/main"/>
+    </p:ext>
+  </p:extLst>
 </p:presentation>
 </file>
 
@@ -198,7 +205,7 @@
           <a:p>
             <a:fld id="{BA1678C9-A18D-45CF-9367-1E47D9870B48}" type="datetimeFigureOut">
               <a:rPr lang="fr-FR" smtClean="0"/>
-              <a:t>23/04/2015</a:t>
+              <a:t>24/04/2015</a:t>
             </a:fld>
             <a:endParaRPr lang="fr-FR"/>
           </a:p>
@@ -357,7 +364,7 @@
           <a:p>
             <a:fld id="{AB04BEE9-F8AB-4446-B6C4-ACDFC459C335}" type="slidenum">
               <a:rPr lang="fr-FR" smtClean="0"/>
-              <a:t>‹N°›</a:t>
+              <a:t>‹#›</a:t>
             </a:fld>
             <a:endParaRPr lang="fr-FR"/>
           </a:p>
@@ -550,6 +557,594 @@
 </p:notes>
 </file>
 
+<file path=ppt/notesSlides/notesSlide2.xml><?xml version="1.0" encoding="utf-8"?>
+<p:notes xmlns:a="http://schemas.openxmlformats.org/drawingml/2006/main" xmlns:r="http://schemas.openxmlformats.org/officeDocument/2006/relationships" xmlns:p="http://schemas.openxmlformats.org/presentationml/2006/main">
+  <p:cSld>
+    <p:spTree>
+      <p:nvGrpSpPr>
+        <p:cNvPr id="1" name=""/>
+        <p:cNvGrpSpPr/>
+        <p:nvPr/>
+      </p:nvGrpSpPr>
+      <p:grpSpPr>
+        <a:xfrm>
+          <a:off x="0" y="0"/>
+          <a:ext cx="0" cy="0"/>
+          <a:chOff x="0" y="0"/>
+          <a:chExt cx="0" cy="0"/>
+        </a:xfrm>
+      </p:grpSpPr>
+      <p:sp>
+        <p:nvSpPr>
+          <p:cNvPr id="2" name="Espace réservé de l'image des diapositives 1"/>
+          <p:cNvSpPr>
+            <a:spLocks noGrp="1" noRot="1" noChangeAspect="1"/>
+          </p:cNvSpPr>
+          <p:nvPr>
+            <p:ph type="sldImg"/>
+          </p:nvPr>
+        </p:nvSpPr>
+        <p:spPr/>
+      </p:sp>
+      <p:sp>
+        <p:nvSpPr>
+          <p:cNvPr id="3" name="Espace réservé des notes 2"/>
+          <p:cNvSpPr>
+            <a:spLocks noGrp="1"/>
+          </p:cNvSpPr>
+          <p:nvPr>
+            <p:ph type="body" idx="1"/>
+          </p:nvPr>
+        </p:nvSpPr>
+        <p:spPr/>
+        <p:txBody>
+          <a:bodyPr/>
+          <a:lstStyle/>
+          <a:p>
+            <a:endParaRPr lang="fr-FR"/>
+          </a:p>
+        </p:txBody>
+      </p:sp>
+      <p:sp>
+        <p:nvSpPr>
+          <p:cNvPr id="4" name="Espace réservé du numéro de diapositive 3"/>
+          <p:cNvSpPr>
+            <a:spLocks noGrp="1"/>
+          </p:cNvSpPr>
+          <p:nvPr>
+            <p:ph type="sldNum" sz="quarter" idx="10"/>
+          </p:nvPr>
+        </p:nvSpPr>
+        <p:spPr/>
+        <p:txBody>
+          <a:bodyPr/>
+          <a:lstStyle/>
+          <a:p>
+            <a:fld id="{AB04BEE9-F8AB-4446-B6C4-ACDFC459C335}" type="slidenum">
+              <a:rPr lang="fr-FR" smtClean="0"/>
+              <a:t>‹#›</a:t>
+            </a:fld>
+            <a:endParaRPr lang="fr-FR"/>
+          </a:p>
+        </p:txBody>
+      </p:sp>
+    </p:spTree>
+    <p:extLst>
+      <p:ext uri="{BB962C8B-B14F-4D97-AF65-F5344CB8AC3E}">
+        <p14:creationId xmlns:p14="http://schemas.microsoft.com/office/powerpoint/2010/main" val="2851176715"/>
+      </p:ext>
+    </p:extLst>
+  </p:cSld>
+  <p:clrMapOvr>
+    <a:masterClrMapping/>
+  </p:clrMapOvr>
+</p:notes>
+</file>
+
+<file path=ppt/notesSlides/notesSlide3.xml><?xml version="1.0" encoding="utf-8"?>
+<p:notes xmlns:a="http://schemas.openxmlformats.org/drawingml/2006/main" xmlns:r="http://schemas.openxmlformats.org/officeDocument/2006/relationships" xmlns:p="http://schemas.openxmlformats.org/presentationml/2006/main">
+  <p:cSld>
+    <p:spTree>
+      <p:nvGrpSpPr>
+        <p:cNvPr id="1" name=""/>
+        <p:cNvGrpSpPr/>
+        <p:nvPr/>
+      </p:nvGrpSpPr>
+      <p:grpSpPr>
+        <a:xfrm>
+          <a:off x="0" y="0"/>
+          <a:ext cx="0" cy="0"/>
+          <a:chOff x="0" y="0"/>
+          <a:chExt cx="0" cy="0"/>
+        </a:xfrm>
+      </p:grpSpPr>
+      <p:sp>
+        <p:nvSpPr>
+          <p:cNvPr id="2" name="Espace réservé de l'image des diapositives 1"/>
+          <p:cNvSpPr>
+            <a:spLocks noGrp="1" noRot="1" noChangeAspect="1"/>
+          </p:cNvSpPr>
+          <p:nvPr>
+            <p:ph type="sldImg"/>
+          </p:nvPr>
+        </p:nvSpPr>
+        <p:spPr/>
+      </p:sp>
+      <p:sp>
+        <p:nvSpPr>
+          <p:cNvPr id="3" name="Espace réservé des notes 2"/>
+          <p:cNvSpPr>
+            <a:spLocks noGrp="1"/>
+          </p:cNvSpPr>
+          <p:nvPr>
+            <p:ph type="body" idx="1"/>
+          </p:nvPr>
+        </p:nvSpPr>
+        <p:spPr/>
+        <p:txBody>
+          <a:bodyPr/>
+          <a:lstStyle/>
+          <a:p>
+            <a:endParaRPr lang="fr-FR"/>
+          </a:p>
+        </p:txBody>
+      </p:sp>
+      <p:sp>
+        <p:nvSpPr>
+          <p:cNvPr id="4" name="Espace réservé du numéro de diapositive 3"/>
+          <p:cNvSpPr>
+            <a:spLocks noGrp="1"/>
+          </p:cNvSpPr>
+          <p:nvPr>
+            <p:ph type="sldNum" sz="quarter" idx="10"/>
+          </p:nvPr>
+        </p:nvSpPr>
+        <p:spPr/>
+        <p:txBody>
+          <a:bodyPr/>
+          <a:lstStyle/>
+          <a:p>
+            <a:fld id="{AB04BEE9-F8AB-4446-B6C4-ACDFC459C335}" type="slidenum">
+              <a:rPr lang="fr-FR" smtClean="0"/>
+              <a:t>‹#›</a:t>
+            </a:fld>
+            <a:endParaRPr lang="fr-FR"/>
+          </a:p>
+        </p:txBody>
+      </p:sp>
+    </p:spTree>
+    <p:extLst>
+      <p:ext uri="{BB962C8B-B14F-4D97-AF65-F5344CB8AC3E}">
+        <p14:creationId xmlns:p14="http://schemas.microsoft.com/office/powerpoint/2010/main" val="2720265361"/>
+      </p:ext>
+    </p:extLst>
+  </p:cSld>
+  <p:clrMapOvr>
+    <a:masterClrMapping/>
+  </p:clrMapOvr>
+</p:notes>
+</file>
+
+<file path=ppt/notesSlides/notesSlide4.xml><?xml version="1.0" encoding="utf-8"?>
+<p:notes xmlns:a="http://schemas.openxmlformats.org/drawingml/2006/main" xmlns:r="http://schemas.openxmlformats.org/officeDocument/2006/relationships" xmlns:p="http://schemas.openxmlformats.org/presentationml/2006/main">
+  <p:cSld>
+    <p:spTree>
+      <p:nvGrpSpPr>
+        <p:cNvPr id="1" name=""/>
+        <p:cNvGrpSpPr/>
+        <p:nvPr/>
+      </p:nvGrpSpPr>
+      <p:grpSpPr>
+        <a:xfrm>
+          <a:off x="0" y="0"/>
+          <a:ext cx="0" cy="0"/>
+          <a:chOff x="0" y="0"/>
+          <a:chExt cx="0" cy="0"/>
+        </a:xfrm>
+      </p:grpSpPr>
+      <p:sp>
+        <p:nvSpPr>
+          <p:cNvPr id="2" name="Espace réservé de l'image des diapositives 1"/>
+          <p:cNvSpPr>
+            <a:spLocks noGrp="1" noRot="1" noChangeAspect="1"/>
+          </p:cNvSpPr>
+          <p:nvPr>
+            <p:ph type="sldImg"/>
+          </p:nvPr>
+        </p:nvSpPr>
+        <p:spPr/>
+      </p:sp>
+      <p:sp>
+        <p:nvSpPr>
+          <p:cNvPr id="3" name="Espace réservé des notes 2"/>
+          <p:cNvSpPr>
+            <a:spLocks noGrp="1"/>
+          </p:cNvSpPr>
+          <p:nvPr>
+            <p:ph type="body" idx="1"/>
+          </p:nvPr>
+        </p:nvSpPr>
+        <p:spPr/>
+        <p:txBody>
+          <a:bodyPr/>
+          <a:lstStyle/>
+          <a:p>
+            <a:endParaRPr lang="fr-FR"/>
+          </a:p>
+        </p:txBody>
+      </p:sp>
+      <p:sp>
+        <p:nvSpPr>
+          <p:cNvPr id="4" name="Espace réservé du numéro de diapositive 3"/>
+          <p:cNvSpPr>
+            <a:spLocks noGrp="1"/>
+          </p:cNvSpPr>
+          <p:nvPr>
+            <p:ph type="sldNum" sz="quarter" idx="10"/>
+          </p:nvPr>
+        </p:nvSpPr>
+        <p:spPr/>
+        <p:txBody>
+          <a:bodyPr/>
+          <a:lstStyle/>
+          <a:p>
+            <a:fld id="{AB04BEE9-F8AB-4446-B6C4-ACDFC459C335}" type="slidenum">
+              <a:rPr lang="fr-FR" smtClean="0"/>
+              <a:t>‹#›</a:t>
+            </a:fld>
+            <a:endParaRPr lang="fr-FR"/>
+          </a:p>
+        </p:txBody>
+      </p:sp>
+    </p:spTree>
+    <p:extLst>
+      <p:ext uri="{BB962C8B-B14F-4D97-AF65-F5344CB8AC3E}">
+        <p14:creationId xmlns:p14="http://schemas.microsoft.com/office/powerpoint/2010/main" val="2364619593"/>
+      </p:ext>
+    </p:extLst>
+  </p:cSld>
+  <p:clrMapOvr>
+    <a:masterClrMapping/>
+  </p:clrMapOvr>
+</p:notes>
+</file>
+
+<file path=ppt/notesSlides/notesSlide5.xml><?xml version="1.0" encoding="utf-8"?>
+<p:notes xmlns:a="http://schemas.openxmlformats.org/drawingml/2006/main" xmlns:r="http://schemas.openxmlformats.org/officeDocument/2006/relationships" xmlns:p="http://schemas.openxmlformats.org/presentationml/2006/main">
+  <p:cSld>
+    <p:spTree>
+      <p:nvGrpSpPr>
+        <p:cNvPr id="1" name=""/>
+        <p:cNvGrpSpPr/>
+        <p:nvPr/>
+      </p:nvGrpSpPr>
+      <p:grpSpPr>
+        <a:xfrm>
+          <a:off x="0" y="0"/>
+          <a:ext cx="0" cy="0"/>
+          <a:chOff x="0" y="0"/>
+          <a:chExt cx="0" cy="0"/>
+        </a:xfrm>
+      </p:grpSpPr>
+      <p:sp>
+        <p:nvSpPr>
+          <p:cNvPr id="2" name="Espace réservé de l'image des diapositives 1"/>
+          <p:cNvSpPr>
+            <a:spLocks noGrp="1" noRot="1" noChangeAspect="1"/>
+          </p:cNvSpPr>
+          <p:nvPr>
+            <p:ph type="sldImg"/>
+          </p:nvPr>
+        </p:nvSpPr>
+        <p:spPr/>
+      </p:sp>
+      <p:sp>
+        <p:nvSpPr>
+          <p:cNvPr id="3" name="Espace réservé des notes 2"/>
+          <p:cNvSpPr>
+            <a:spLocks noGrp="1"/>
+          </p:cNvSpPr>
+          <p:nvPr>
+            <p:ph type="body" idx="1"/>
+          </p:nvPr>
+        </p:nvSpPr>
+        <p:spPr/>
+        <p:txBody>
+          <a:bodyPr/>
+          <a:lstStyle/>
+          <a:p>
+            <a:endParaRPr lang="fr-FR"/>
+          </a:p>
+        </p:txBody>
+      </p:sp>
+      <p:sp>
+        <p:nvSpPr>
+          <p:cNvPr id="4" name="Espace réservé du numéro de diapositive 3"/>
+          <p:cNvSpPr>
+            <a:spLocks noGrp="1"/>
+          </p:cNvSpPr>
+          <p:nvPr>
+            <p:ph type="sldNum" sz="quarter" idx="10"/>
+          </p:nvPr>
+        </p:nvSpPr>
+        <p:spPr/>
+        <p:txBody>
+          <a:bodyPr/>
+          <a:lstStyle/>
+          <a:p>
+            <a:fld id="{AB04BEE9-F8AB-4446-B6C4-ACDFC459C335}" type="slidenum">
+              <a:rPr lang="fr-FR" smtClean="0"/>
+              <a:t>5</a:t>
+            </a:fld>
+            <a:endParaRPr lang="fr-FR"/>
+          </a:p>
+        </p:txBody>
+      </p:sp>
+    </p:spTree>
+    <p:extLst>
+      <p:ext uri="{BB962C8B-B14F-4D97-AF65-F5344CB8AC3E}">
+        <p14:creationId xmlns:p14="http://schemas.microsoft.com/office/powerpoint/2010/main" val="122359236"/>
+      </p:ext>
+    </p:extLst>
+  </p:cSld>
+  <p:clrMapOvr>
+    <a:masterClrMapping/>
+  </p:clrMapOvr>
+</p:notes>
+</file>
+
+<file path=ppt/notesSlides/notesSlide6.xml><?xml version="1.0" encoding="utf-8"?>
+<p:notes xmlns:a="http://schemas.openxmlformats.org/drawingml/2006/main" xmlns:r="http://schemas.openxmlformats.org/officeDocument/2006/relationships" xmlns:p="http://schemas.openxmlformats.org/presentationml/2006/main">
+  <p:cSld>
+    <p:spTree>
+      <p:nvGrpSpPr>
+        <p:cNvPr id="1" name=""/>
+        <p:cNvGrpSpPr/>
+        <p:nvPr/>
+      </p:nvGrpSpPr>
+      <p:grpSpPr>
+        <a:xfrm>
+          <a:off x="0" y="0"/>
+          <a:ext cx="0" cy="0"/>
+          <a:chOff x="0" y="0"/>
+          <a:chExt cx="0" cy="0"/>
+        </a:xfrm>
+      </p:grpSpPr>
+      <p:sp>
+        <p:nvSpPr>
+          <p:cNvPr id="2" name="Espace réservé de l'image des diapositives 1"/>
+          <p:cNvSpPr>
+            <a:spLocks noGrp="1" noRot="1" noChangeAspect="1"/>
+          </p:cNvSpPr>
+          <p:nvPr>
+            <p:ph type="sldImg"/>
+          </p:nvPr>
+        </p:nvSpPr>
+        <p:spPr/>
+      </p:sp>
+      <p:sp>
+        <p:nvSpPr>
+          <p:cNvPr id="3" name="Espace réservé des notes 2"/>
+          <p:cNvSpPr>
+            <a:spLocks noGrp="1"/>
+          </p:cNvSpPr>
+          <p:nvPr>
+            <p:ph type="body" idx="1"/>
+          </p:nvPr>
+        </p:nvSpPr>
+        <p:spPr/>
+        <p:txBody>
+          <a:bodyPr/>
+          <a:lstStyle/>
+          <a:p>
+            <a:endParaRPr lang="fr-FR"/>
+          </a:p>
+        </p:txBody>
+      </p:sp>
+      <p:sp>
+        <p:nvSpPr>
+          <p:cNvPr id="4" name="Espace réservé du numéro de diapositive 3"/>
+          <p:cNvSpPr>
+            <a:spLocks noGrp="1"/>
+          </p:cNvSpPr>
+          <p:nvPr>
+            <p:ph type="sldNum" sz="quarter" idx="10"/>
+          </p:nvPr>
+        </p:nvSpPr>
+        <p:spPr/>
+        <p:txBody>
+          <a:bodyPr/>
+          <a:lstStyle/>
+          <a:p>
+            <a:fld id="{AB04BEE9-F8AB-4446-B6C4-ACDFC459C335}" type="slidenum">
+              <a:rPr lang="fr-FR" smtClean="0"/>
+              <a:t>6</a:t>
+            </a:fld>
+            <a:endParaRPr lang="fr-FR"/>
+          </a:p>
+        </p:txBody>
+      </p:sp>
+    </p:spTree>
+    <p:extLst>
+      <p:ext uri="{BB962C8B-B14F-4D97-AF65-F5344CB8AC3E}">
+        <p14:creationId xmlns:p14="http://schemas.microsoft.com/office/powerpoint/2010/main" val="3934560316"/>
+      </p:ext>
+    </p:extLst>
+  </p:cSld>
+  <p:clrMapOvr>
+    <a:masterClrMapping/>
+  </p:clrMapOvr>
+</p:notes>
+</file>
+
+<file path=ppt/notesSlides/notesSlide7.xml><?xml version="1.0" encoding="utf-8"?>
+<p:notes xmlns:a="http://schemas.openxmlformats.org/drawingml/2006/main" xmlns:r="http://schemas.openxmlformats.org/officeDocument/2006/relationships" xmlns:p="http://schemas.openxmlformats.org/presentationml/2006/main">
+  <p:cSld>
+    <p:spTree>
+      <p:nvGrpSpPr>
+        <p:cNvPr id="1" name=""/>
+        <p:cNvGrpSpPr/>
+        <p:nvPr/>
+      </p:nvGrpSpPr>
+      <p:grpSpPr>
+        <a:xfrm>
+          <a:off x="0" y="0"/>
+          <a:ext cx="0" cy="0"/>
+          <a:chOff x="0" y="0"/>
+          <a:chExt cx="0" cy="0"/>
+        </a:xfrm>
+      </p:grpSpPr>
+      <p:sp>
+        <p:nvSpPr>
+          <p:cNvPr id="2" name="Espace réservé de l'image des diapositives 1"/>
+          <p:cNvSpPr>
+            <a:spLocks noGrp="1" noRot="1" noChangeAspect="1"/>
+          </p:cNvSpPr>
+          <p:nvPr>
+            <p:ph type="sldImg"/>
+          </p:nvPr>
+        </p:nvSpPr>
+        <p:spPr/>
+      </p:sp>
+      <p:sp>
+        <p:nvSpPr>
+          <p:cNvPr id="3" name="Espace réservé des notes 2"/>
+          <p:cNvSpPr>
+            <a:spLocks noGrp="1"/>
+          </p:cNvSpPr>
+          <p:nvPr>
+            <p:ph type="body" idx="1"/>
+          </p:nvPr>
+        </p:nvSpPr>
+        <p:spPr/>
+        <p:txBody>
+          <a:bodyPr/>
+          <a:lstStyle/>
+          <a:p>
+            <a:endParaRPr lang="fr-FR"/>
+          </a:p>
+        </p:txBody>
+      </p:sp>
+      <p:sp>
+        <p:nvSpPr>
+          <p:cNvPr id="4" name="Espace réservé du numéro de diapositive 3"/>
+          <p:cNvSpPr>
+            <a:spLocks noGrp="1"/>
+          </p:cNvSpPr>
+          <p:nvPr>
+            <p:ph type="sldNum" sz="quarter" idx="10"/>
+          </p:nvPr>
+        </p:nvSpPr>
+        <p:spPr/>
+        <p:txBody>
+          <a:bodyPr/>
+          <a:lstStyle/>
+          <a:p>
+            <a:fld id="{AB04BEE9-F8AB-4446-B6C4-ACDFC459C335}" type="slidenum">
+              <a:rPr lang="fr-FR" smtClean="0"/>
+              <a:t>‹#›</a:t>
+            </a:fld>
+            <a:endParaRPr lang="fr-FR"/>
+          </a:p>
+        </p:txBody>
+      </p:sp>
+    </p:spTree>
+    <p:extLst>
+      <p:ext uri="{BB962C8B-B14F-4D97-AF65-F5344CB8AC3E}">
+        <p14:creationId xmlns:p14="http://schemas.microsoft.com/office/powerpoint/2010/main" val="883017944"/>
+      </p:ext>
+    </p:extLst>
+  </p:cSld>
+  <p:clrMapOvr>
+    <a:masterClrMapping/>
+  </p:clrMapOvr>
+</p:notes>
+</file>
+
+<file path=ppt/notesSlides/notesSlide8.xml><?xml version="1.0" encoding="utf-8"?>
+<p:notes xmlns:a="http://schemas.openxmlformats.org/drawingml/2006/main" xmlns:r="http://schemas.openxmlformats.org/officeDocument/2006/relationships" xmlns:p="http://schemas.openxmlformats.org/presentationml/2006/main">
+  <p:cSld>
+    <p:spTree>
+      <p:nvGrpSpPr>
+        <p:cNvPr id="1" name=""/>
+        <p:cNvGrpSpPr/>
+        <p:nvPr/>
+      </p:nvGrpSpPr>
+      <p:grpSpPr>
+        <a:xfrm>
+          <a:off x="0" y="0"/>
+          <a:ext cx="0" cy="0"/>
+          <a:chOff x="0" y="0"/>
+          <a:chExt cx="0" cy="0"/>
+        </a:xfrm>
+      </p:grpSpPr>
+      <p:sp>
+        <p:nvSpPr>
+          <p:cNvPr id="2" name="Espace réservé de l'image des diapositives 1"/>
+          <p:cNvSpPr>
+            <a:spLocks noGrp="1" noRot="1" noChangeAspect="1"/>
+          </p:cNvSpPr>
+          <p:nvPr>
+            <p:ph type="sldImg"/>
+          </p:nvPr>
+        </p:nvSpPr>
+        <p:spPr/>
+      </p:sp>
+      <p:sp>
+        <p:nvSpPr>
+          <p:cNvPr id="3" name="Espace réservé des notes 2"/>
+          <p:cNvSpPr>
+            <a:spLocks noGrp="1"/>
+          </p:cNvSpPr>
+          <p:nvPr>
+            <p:ph type="body" idx="1"/>
+          </p:nvPr>
+        </p:nvSpPr>
+        <p:spPr/>
+        <p:txBody>
+          <a:bodyPr/>
+          <a:lstStyle/>
+          <a:p>
+            <a:endParaRPr lang="fr-FR"/>
+          </a:p>
+        </p:txBody>
+      </p:sp>
+      <p:sp>
+        <p:nvSpPr>
+          <p:cNvPr id="4" name="Espace réservé du numéro de diapositive 3"/>
+          <p:cNvSpPr>
+            <a:spLocks noGrp="1"/>
+          </p:cNvSpPr>
+          <p:nvPr>
+            <p:ph type="sldNum" sz="quarter" idx="10"/>
+          </p:nvPr>
+        </p:nvSpPr>
+        <p:spPr/>
+        <p:txBody>
+          <a:bodyPr/>
+          <a:lstStyle/>
+          <a:p>
+            <a:fld id="{AB04BEE9-F8AB-4446-B6C4-ACDFC459C335}" type="slidenum">
+              <a:rPr lang="fr-FR" smtClean="0"/>
+              <a:t>‹#›</a:t>
+            </a:fld>
+            <a:endParaRPr lang="fr-FR"/>
+          </a:p>
+        </p:txBody>
+      </p:sp>
+    </p:spTree>
+    <p:extLst>
+      <p:ext uri="{BB962C8B-B14F-4D97-AF65-F5344CB8AC3E}">
+        <p14:creationId xmlns:p14="http://schemas.microsoft.com/office/powerpoint/2010/main" val="306293296"/>
+      </p:ext>
+    </p:extLst>
+  </p:cSld>
+  <p:clrMapOvr>
+    <a:masterClrMapping/>
+  </p:clrMapOvr>
+</p:notes>
+</file>
+
 <file path=ppt/slideLayouts/slideLayout1.xml><?xml version="1.0" encoding="utf-8"?>
 <p:sldLayout xmlns:a="http://schemas.openxmlformats.org/drawingml/2006/main" xmlns:r="http://schemas.openxmlformats.org/officeDocument/2006/relationships" xmlns:p="http://schemas.openxmlformats.org/presentationml/2006/main" type="title" preserve="1">
   <p:cSld name="Diapositive de titre">
@@ -734,7 +1329,7 @@
           <a:p>
             <a:fld id="{AF2AB7E8-8710-491B-A675-D02618D68CCC}" type="slidenum">
               <a:rPr lang="fr-FR" smtClean="0"/>
-              <a:t>‹N°›</a:t>
+              <a:t>‹#›</a:t>
             </a:fld>
             <a:endParaRPr lang="fr-FR"/>
           </a:p>
@@ -904,7 +1499,7 @@
           <a:p>
             <a:fld id="{AF2AB7E8-8710-491B-A675-D02618D68CCC}" type="slidenum">
               <a:rPr lang="fr-FR" smtClean="0"/>
-              <a:t>‹N°›</a:t>
+              <a:t>‹#›</a:t>
             </a:fld>
             <a:endParaRPr lang="fr-FR"/>
           </a:p>
@@ -1084,7 +1679,7 @@
           <a:p>
             <a:fld id="{AF2AB7E8-8710-491B-A675-D02618D68CCC}" type="slidenum">
               <a:rPr lang="fr-FR" smtClean="0"/>
-              <a:t>‹N°›</a:t>
+              <a:t>‹#›</a:t>
             </a:fld>
             <a:endParaRPr lang="fr-FR"/>
           </a:p>
@@ -1867,7 +2462,7 @@
           <a:p>
             <a:fld id="{AF2AB7E8-8710-491B-A675-D02618D68CCC}" type="slidenum">
               <a:rPr lang="fr-FR" smtClean="0"/>
-              <a:t>‹N°›</a:t>
+              <a:t>‹#›</a:t>
             </a:fld>
             <a:endParaRPr lang="fr-FR"/>
           </a:p>
@@ -2043,7 +2638,7 @@
           <a:p>
             <a:fld id="{AF2AB7E8-8710-491B-A675-D02618D68CCC}" type="slidenum">
               <a:rPr lang="fr-FR" smtClean="0"/>
-              <a:t>‹N°›</a:t>
+              <a:t>‹#›</a:t>
             </a:fld>
             <a:endParaRPr lang="fr-FR"/>
           </a:p>
@@ -2290,7 +2885,7 @@
           <a:p>
             <a:fld id="{AF2AB7E8-8710-491B-A675-D02618D68CCC}" type="slidenum">
               <a:rPr lang="fr-FR" smtClean="0"/>
-              <a:t>‹N°›</a:t>
+              <a:t>‹#›</a:t>
             </a:fld>
             <a:endParaRPr lang="fr-FR"/>
           </a:p>
@@ -2522,7 +3117,7 @@
           <a:p>
             <a:fld id="{AF2AB7E8-8710-491B-A675-D02618D68CCC}" type="slidenum">
               <a:rPr lang="fr-FR" smtClean="0"/>
-              <a:t>‹N°›</a:t>
+              <a:t>‹#›</a:t>
             </a:fld>
             <a:endParaRPr lang="fr-FR"/>
           </a:p>
@@ -2896,7 +3491,7 @@
           <a:p>
             <a:fld id="{AF2AB7E8-8710-491B-A675-D02618D68CCC}" type="slidenum">
               <a:rPr lang="fr-FR" smtClean="0"/>
-              <a:t>‹N°›</a:t>
+              <a:t>‹#›</a:t>
             </a:fld>
             <a:endParaRPr lang="fr-FR"/>
           </a:p>
@@ -3019,7 +3614,7 @@
           <a:p>
             <a:fld id="{AF2AB7E8-8710-491B-A675-D02618D68CCC}" type="slidenum">
               <a:rPr lang="fr-FR" smtClean="0"/>
-              <a:t>‹N°›</a:t>
+              <a:t>‹#›</a:t>
             </a:fld>
             <a:endParaRPr lang="fr-FR"/>
           </a:p>
@@ -3114,7 +3709,7 @@
           <a:p>
             <a:fld id="{AF2AB7E8-8710-491B-A675-D02618D68CCC}" type="slidenum">
               <a:rPr lang="fr-FR" smtClean="0"/>
-              <a:t>‹N°›</a:t>
+              <a:t>‹#›</a:t>
             </a:fld>
             <a:endParaRPr lang="fr-FR"/>
           </a:p>
@@ -3369,7 +3964,7 @@
           <a:p>
             <a:fld id="{AF2AB7E8-8710-491B-A675-D02618D68CCC}" type="slidenum">
               <a:rPr lang="fr-FR" smtClean="0"/>
-              <a:t>‹N°›</a:t>
+              <a:t>‹#›</a:t>
             </a:fld>
             <a:endParaRPr lang="fr-FR"/>
           </a:p>
@@ -3539,7 +4134,7 @@
           <a:p>
             <a:fld id="{AF2AB7E8-8710-491B-A675-D02618D68CCC}" type="slidenum">
               <a:rPr lang="fr-FR" smtClean="0"/>
-              <a:t>‹N°›</a:t>
+              <a:t>‹#›</a:t>
             </a:fld>
             <a:endParaRPr lang="fr-FR"/>
           </a:p>
@@ -3802,7 +4397,7 @@
           <a:p>
             <a:fld id="{AF2AB7E8-8710-491B-A675-D02618D68CCC}" type="slidenum">
               <a:rPr lang="fr-FR" smtClean="0"/>
-              <a:t>‹N°›</a:t>
+              <a:t>‹#›</a:t>
             </a:fld>
             <a:endParaRPr lang="fr-FR"/>
           </a:p>
@@ -4053,7 +4648,7 @@
           <a:p>
             <a:fld id="{AF2AB7E8-8710-491B-A675-D02618D68CCC}" type="slidenum">
               <a:rPr lang="fr-FR" smtClean="0"/>
-              <a:t>‹N°›</a:t>
+              <a:t>‹#›</a:t>
             </a:fld>
             <a:endParaRPr lang="fr-FR"/>
           </a:p>
@@ -4367,7 +4962,7 @@
           <a:p>
             <a:fld id="{AF2AB7E8-8710-491B-A675-D02618D68CCC}" type="slidenum">
               <a:rPr lang="fr-FR" smtClean="0"/>
-              <a:t>‹N°›</a:t>
+              <a:t>‹#›</a:t>
             </a:fld>
             <a:endParaRPr lang="fr-FR"/>
           </a:p>
@@ -4708,7 +5303,7 @@
           <a:p>
             <a:fld id="{AF2AB7E8-8710-491B-A675-D02618D68CCC}" type="slidenum">
               <a:rPr lang="fr-FR" smtClean="0"/>
-              <a:t>‹N°›</a:t>
+              <a:t>‹#›</a:t>
             </a:fld>
             <a:endParaRPr lang="fr-FR"/>
           </a:p>
@@ -5022,7 +5617,7 @@
           <a:p>
             <a:fld id="{AF2AB7E8-8710-491B-A675-D02618D68CCC}" type="slidenum">
               <a:rPr lang="fr-FR" smtClean="0"/>
-              <a:t>‹N°›</a:t>
+              <a:t>‹#›</a:t>
             </a:fld>
             <a:endParaRPr lang="fr-FR"/>
           </a:p>
@@ -5415,7 +6010,7 @@
           <a:p>
             <a:fld id="{AF2AB7E8-8710-491B-A675-D02618D68CCC}" type="slidenum">
               <a:rPr lang="fr-FR" smtClean="0"/>
-              <a:t>‹N°›</a:t>
+              <a:t>‹#›</a:t>
             </a:fld>
             <a:endParaRPr lang="fr-FR"/>
           </a:p>
@@ -5585,7 +6180,7 @@
           <a:p>
             <a:fld id="{AF2AB7E8-8710-491B-A675-D02618D68CCC}" type="slidenum">
               <a:rPr lang="fr-FR" smtClean="0"/>
-              <a:t>‹N°›</a:t>
+              <a:t>‹#›</a:t>
             </a:fld>
             <a:endParaRPr lang="fr-FR"/>
           </a:p>
@@ -5765,7 +6360,7 @@
           <a:p>
             <a:fld id="{AF2AB7E8-8710-491B-A675-D02618D68CCC}" type="slidenum">
               <a:rPr lang="fr-FR" smtClean="0"/>
-              <a:t>‹N°›</a:t>
+              <a:t>‹#›</a:t>
             </a:fld>
             <a:endParaRPr lang="fr-FR"/>
           </a:p>
@@ -6016,7 +6611,7 @@
           <a:p>
             <a:fld id="{AF2AB7E8-8710-491B-A675-D02618D68CCC}" type="slidenum">
               <a:rPr lang="fr-FR" smtClean="0"/>
-              <a:t>‹N°›</a:t>
+              <a:t>‹#›</a:t>
             </a:fld>
             <a:endParaRPr lang="fr-FR"/>
           </a:p>
@@ -6248,7 +6843,7 @@
           <a:p>
             <a:fld id="{AF2AB7E8-8710-491B-A675-D02618D68CCC}" type="slidenum">
               <a:rPr lang="fr-FR" smtClean="0"/>
-              <a:t>‹N°›</a:t>
+              <a:t>‹#›</a:t>
             </a:fld>
             <a:endParaRPr lang="fr-FR"/>
           </a:p>
@@ -6595,7 +7190,7 @@
           <a:p>
             <a:fld id="{AF2AB7E8-8710-491B-A675-D02618D68CCC}" type="slidenum">
               <a:rPr lang="fr-FR" smtClean="0"/>
-              <a:t>‹N°›</a:t>
+              <a:t>‹#›</a:t>
             </a:fld>
             <a:endParaRPr lang="fr-FR"/>
           </a:p>
@@ -6713,7 +7308,7 @@
           <a:p>
             <a:fld id="{AF2AB7E8-8710-491B-A675-D02618D68CCC}" type="slidenum">
               <a:rPr lang="fr-FR" smtClean="0"/>
-              <a:t>‹N°›</a:t>
+              <a:t>‹#›</a:t>
             </a:fld>
             <a:endParaRPr lang="fr-FR"/>
           </a:p>
@@ -6831,7 +7426,7 @@
           <a:p>
             <a:fld id="{AF2AB7E8-8710-491B-A675-D02618D68CCC}" type="slidenum">
               <a:rPr lang="fr-FR" smtClean="0"/>
-              <a:t>‹N°›</a:t>
+              <a:t>‹#›</a:t>
             </a:fld>
             <a:endParaRPr lang="fr-FR"/>
           </a:p>
@@ -7115,7 +7710,7 @@
           <a:p>
             <a:fld id="{AF2AB7E8-8710-491B-A675-D02618D68CCC}" type="slidenum">
               <a:rPr lang="fr-FR" smtClean="0"/>
-              <a:t>‹N°›</a:t>
+              <a:t>‹#›</a:t>
             </a:fld>
             <a:endParaRPr lang="fr-FR"/>
           </a:p>
@@ -7379,7 +7974,7 @@
           <a:p>
             <a:fld id="{AF2AB7E8-8710-491B-A675-D02618D68CCC}" type="slidenum">
               <a:rPr lang="fr-FR" smtClean="0"/>
-              <a:t>‹N°›</a:t>
+              <a:t>‹#›</a:t>
             </a:fld>
             <a:endParaRPr lang="fr-FR"/>
           </a:p>
@@ -7630,7 +8225,7 @@
           <a:p>
             <a:fld id="{AF2AB7E8-8710-491B-A675-D02618D68CCC}" type="slidenum">
               <a:rPr lang="fr-FR" smtClean="0"/>
-              <a:t>‹N°›</a:t>
+              <a:t>‹#›</a:t>
             </a:fld>
             <a:endParaRPr lang="fr-FR"/>
           </a:p>
@@ -8687,7 +9282,7 @@
           <a:p>
             <a:fld id="{AF2AB7E8-8710-491B-A675-D02618D68CCC}" type="slidenum">
               <a:rPr lang="fr-FR" smtClean="0"/>
-              <a:t>‹N°›</a:t>
+              <a:t>‹#›</a:t>
             </a:fld>
             <a:endParaRPr lang="fr-FR"/>
           </a:p>
@@ -9381,7 +9976,7 @@
           </p:nvPr>
         </p:nvPicPr>
         <p:blipFill>
-          <a:blip r:embed="rId2">
+          <a:blip r:embed="rId3">
             <a:extLst>
               <a:ext uri="{28A0092B-C50C-407E-A947-70E740481C1C}">
                 <a14:useLocalDpi xmlns:a14="http://schemas.microsoft.com/office/drawing/2010/main" val="0"/>
@@ -9408,7 +10003,7 @@
           <p:nvPr/>
         </p:nvPicPr>
         <p:blipFill>
-          <a:blip r:embed="rId3">
+          <a:blip r:embed="rId4">
             <a:extLst>
               <a:ext uri="{28A0092B-C50C-407E-A947-70E740481C1C}">
                 <a14:useLocalDpi xmlns:a14="http://schemas.microsoft.com/office/drawing/2010/main" val="0"/>
@@ -9438,7 +10033,7 @@
           <p:nvPr/>
         </p:nvPicPr>
         <p:blipFill>
-          <a:blip r:embed="rId4">
+          <a:blip r:embed="rId5">
             <a:extLst>
               <a:ext uri="{28A0092B-C50C-407E-A947-70E740481C1C}">
                 <a14:useLocalDpi xmlns:a14="http://schemas.microsoft.com/office/drawing/2010/main" val="0"/>
@@ -9672,6 +10267,31 @@
           </a:p>
         </p:txBody>
       </p:sp>
+      <p:pic>
+        <p:nvPicPr>
+          <p:cNvPr id="2" name="Image 1" descr="57.png"/>
+          <p:cNvPicPr>
+            <a:picLocks noChangeAspect="1"/>
+          </p:cNvPicPr>
+          <p:nvPr/>
+        </p:nvPicPr>
+        <p:blipFill>
+          <a:blip r:embed="rId3"/>
+          <a:srcRect l="15172" t="994" r="20781" b="392"/>
+          <a:stretch>
+            <a:fillRect/>
+          </a:stretch>
+        </p:blipFill>
+        <p:spPr>
+          <a:xfrm>
+            <a:off x="980940" y="1996418"/>
+            <a:ext cx="5513424" cy="4791174"/>
+          </a:xfrm>
+          <a:prstGeom prst="rect">
+            <a:avLst/>
+          </a:prstGeom>
+        </p:spPr>
+      </p:pic>
     </p:spTree>
     <p:extLst>
       <p:ext uri="{BB962C8B-B14F-4D97-AF65-F5344CB8AC3E}">
@@ -9813,6 +10433,31 @@
           </a:p>
         </p:txBody>
       </p:sp>
+      <p:pic>
+        <p:nvPicPr>
+          <p:cNvPr id="7" name="Image 6" descr="35.png"/>
+          <p:cNvPicPr>
+            <a:picLocks noChangeAspect="1"/>
+          </p:cNvPicPr>
+          <p:nvPr/>
+        </p:nvPicPr>
+        <p:blipFill>
+          <a:blip r:embed="rId3"/>
+          <a:srcRect l="17835" t="864" r="17890" b="11123"/>
+          <a:stretch>
+            <a:fillRect/>
+          </a:stretch>
+        </p:blipFill>
+        <p:spPr>
+          <a:xfrm>
+            <a:off x="1042988" y="2014955"/>
+            <a:ext cx="5934920" cy="4587809"/>
+          </a:xfrm>
+          <a:prstGeom prst="rect">
+            <a:avLst/>
+          </a:prstGeom>
+        </p:spPr>
+      </p:pic>
     </p:spTree>
     <p:extLst>
       <p:ext uri="{BB962C8B-B14F-4D97-AF65-F5344CB8AC3E}">
@@ -9860,14 +10505,26 @@
             <p:ph type="title"/>
           </p:nvPr>
         </p:nvSpPr>
-        <p:spPr/>
+        <p:spPr>
+          <a:xfrm>
+            <a:off x="677334" y="609600"/>
+            <a:ext cx="8596668" cy="2085474"/>
+          </a:xfrm>
+        </p:spPr>
         <p:txBody>
           <a:bodyPr/>
           <a:lstStyle/>
           <a:p>
             <a:r>
               <a:rPr lang="fr-FR" u="sng" dirty="0" smtClean="0"/>
-              <a:t>Choix des paramètres</a:t>
+              <a:t>L’application:</a:t>
+            </a:r>
+            <a:br>
+              <a:rPr lang="fr-FR" u="sng" dirty="0" smtClean="0"/>
+            </a:br>
+            <a:r>
+              <a:rPr lang="fr-FR" i="1" dirty="0" smtClean="0"/>
+              <a:t>Affichage des résultats</a:t>
             </a:r>
             <a:endParaRPr lang="fr-FR" u="sng" dirty="0"/>
           </a:p>
@@ -9890,19 +10547,7 @@
           <a:p>
             <a:r>
               <a:rPr lang="fr-FR" dirty="0" smtClean="0"/>
-              <a:t>K = </a:t>
-            </a:r>
-          </a:p>
-          <a:p>
-            <a:r>
-              <a:rPr lang="fr-FR" dirty="0" smtClean="0"/>
-              <a:t>N = </a:t>
-            </a:r>
-          </a:p>
-          <a:p>
-            <a:r>
-              <a:rPr lang="fr-FR" dirty="0" smtClean="0"/>
-              <a:t>Nombre de colonnes sélectionnées = </a:t>
+              <a:t>Image écran</a:t>
             </a:r>
             <a:endParaRPr lang="fr-FR" dirty="0"/>
           </a:p>
@@ -9954,10 +10599,35 @@
           </a:p>
         </p:txBody>
       </p:sp>
+      <p:pic>
+        <p:nvPicPr>
+          <p:cNvPr id="6" name="Image 5" descr="42.png"/>
+          <p:cNvPicPr>
+            <a:picLocks noChangeAspect="1"/>
+          </p:cNvPicPr>
+          <p:nvPr/>
+        </p:nvPicPr>
+        <p:blipFill>
+          <a:blip r:embed="rId3"/>
+          <a:srcRect l="18125" t="2043" r="9867" b="6353"/>
+          <a:stretch>
+            <a:fillRect/>
+          </a:stretch>
+        </p:blipFill>
+        <p:spPr>
+          <a:xfrm>
+            <a:off x="1110264" y="1739900"/>
+            <a:ext cx="6944734" cy="4992596"/>
+          </a:xfrm>
+          <a:prstGeom prst="rect">
+            <a:avLst/>
+          </a:prstGeom>
+        </p:spPr>
+      </p:pic>
     </p:spTree>
     <p:extLst>
       <p:ext uri="{BB962C8B-B14F-4D97-AF65-F5344CB8AC3E}">
-        <p14:creationId xmlns:p14="http://schemas.microsoft.com/office/powerpoint/2010/main" val="3939149527"/>
+        <p14:creationId xmlns:p14="http://schemas.microsoft.com/office/powerpoint/2010/main" val="2243292381"/>
       </p:ext>
     </p:extLst>
   </p:cSld>
@@ -10001,6 +10671,41 @@
             <p:ph type="title"/>
           </p:nvPr>
         </p:nvSpPr>
+        <p:spPr>
+          <a:xfrm>
+            <a:off x="677334" y="609600"/>
+            <a:ext cx="8596668" cy="2085474"/>
+          </a:xfrm>
+        </p:spPr>
+        <p:txBody>
+          <a:bodyPr/>
+          <a:lstStyle/>
+          <a:p>
+            <a:r>
+              <a:rPr lang="fr-FR" u="sng" dirty="0" smtClean="0"/>
+              <a:t>L’application:</a:t>
+            </a:r>
+            <a:br>
+              <a:rPr lang="fr-FR" u="sng" dirty="0" smtClean="0"/>
+            </a:br>
+            <a:r>
+              <a:rPr lang="fr-FR" i="1" dirty="0" smtClean="0"/>
+              <a:t>Affichage des résultats</a:t>
+            </a:r>
+            <a:endParaRPr lang="fr-FR" u="sng" dirty="0"/>
+          </a:p>
+        </p:txBody>
+      </p:sp>
+      <p:sp>
+        <p:nvSpPr>
+          <p:cNvPr id="3" name="Espace réservé du contenu 2"/>
+          <p:cNvSpPr>
+            <a:spLocks noGrp="1"/>
+          </p:cNvSpPr>
+          <p:nvPr>
+            <p:ph idx="1"/>
+          </p:nvPr>
+        </p:nvSpPr>
         <p:spPr/>
         <p:txBody>
           <a:bodyPr/>
@@ -10008,13 +10713,140 @@
           <a:p>
             <a:r>
               <a:rPr lang="fr-FR" dirty="0" smtClean="0"/>
-              <a:t>Un merci pour </a:t>
-            </a:r>
-            <a:r>
-              <a:rPr lang="fr-FR" smtClean="0"/>
-              <a:t>votre attention,,,</a:t>
-            </a:r>
-            <a:endParaRPr lang="fr-FR"/>
+              <a:t>Image écran</a:t>
+            </a:r>
+            <a:endParaRPr lang="fr-FR" dirty="0"/>
+          </a:p>
+        </p:txBody>
+      </p:sp>
+      <p:sp>
+        <p:nvSpPr>
+          <p:cNvPr id="4" name="Espace réservé de la date 3"/>
+          <p:cNvSpPr>
+            <a:spLocks noGrp="1"/>
+          </p:cNvSpPr>
+          <p:nvPr>
+            <p:ph type="dt" sz="half" idx="10"/>
+          </p:nvPr>
+        </p:nvSpPr>
+        <p:spPr/>
+        <p:txBody>
+          <a:bodyPr/>
+          <a:lstStyle/>
+          <a:p>
+            <a:r>
+              <a:rPr lang="fr-FR" smtClean="0"/>
+              <a:t>24/04/2015</a:t>
+            </a:r>
+            <a:endParaRPr lang="fr-FR"/>
+          </a:p>
+        </p:txBody>
+      </p:sp>
+      <p:sp>
+        <p:nvSpPr>
+          <p:cNvPr id="5" name="Espace réservé du numéro de diapositive 4"/>
+          <p:cNvSpPr>
+            <a:spLocks noGrp="1"/>
+          </p:cNvSpPr>
+          <p:nvPr>
+            <p:ph type="sldNum" sz="quarter" idx="12"/>
+          </p:nvPr>
+        </p:nvSpPr>
+        <p:spPr/>
+        <p:txBody>
+          <a:bodyPr/>
+          <a:lstStyle/>
+          <a:p>
+            <a:fld id="{AF2AB7E8-8710-491B-A675-D02618D68CCC}" type="slidenum">
+              <a:rPr lang="fr-FR" smtClean="0"/>
+              <a:t>6</a:t>
+            </a:fld>
+            <a:endParaRPr lang="fr-FR"/>
+          </a:p>
+        </p:txBody>
+      </p:sp>
+      <p:pic>
+        <p:nvPicPr>
+          <p:cNvPr id="8" name="Image 7" descr="55.png"/>
+          <p:cNvPicPr>
+            <a:picLocks noChangeAspect="1"/>
+          </p:cNvPicPr>
+          <p:nvPr/>
+        </p:nvPicPr>
+        <p:blipFill>
+          <a:blip r:embed="rId3"/>
+          <a:srcRect l="15481" t="32665" r="26999" b="2628"/>
+          <a:stretch>
+            <a:fillRect/>
+          </a:stretch>
+        </p:blipFill>
+        <p:spPr>
+          <a:xfrm>
+            <a:off x="1006475" y="1878013"/>
+            <a:ext cx="7634609" cy="4846771"/>
+          </a:xfrm>
+          <a:prstGeom prst="rect">
+            <a:avLst/>
+          </a:prstGeom>
+        </p:spPr>
+      </p:pic>
+    </p:spTree>
+    <p:extLst>
+      <p:ext uri="{BB962C8B-B14F-4D97-AF65-F5344CB8AC3E}">
+        <p14:creationId xmlns:p14="http://schemas.microsoft.com/office/powerpoint/2010/main" val="1316535319"/>
+      </p:ext>
+    </p:extLst>
+  </p:cSld>
+  <p:clrMapOvr>
+    <a:masterClrMapping/>
+  </p:clrMapOvr>
+  <p:timing>
+    <p:tnLst>
+      <p:par>
+        <p:cTn id="1" dur="indefinite" restart="never" nodeType="tmRoot"/>
+      </p:par>
+    </p:tnLst>
+  </p:timing>
+</p:sld>
+</file>
+
+<file path=ppt/slides/slide7.xml><?xml version="1.0" encoding="utf-8"?>
+<p:sld xmlns:a="http://schemas.openxmlformats.org/drawingml/2006/main" xmlns:r="http://schemas.openxmlformats.org/officeDocument/2006/relationships" xmlns:p="http://schemas.openxmlformats.org/presentationml/2006/main">
+  <p:cSld>
+    <p:spTree>
+      <p:nvGrpSpPr>
+        <p:cNvPr id="1" name=""/>
+        <p:cNvGrpSpPr/>
+        <p:nvPr/>
+      </p:nvGrpSpPr>
+      <p:grpSpPr>
+        <a:xfrm>
+          <a:off x="0" y="0"/>
+          <a:ext cx="0" cy="0"/>
+          <a:chOff x="0" y="0"/>
+          <a:chExt cx="0" cy="0"/>
+        </a:xfrm>
+      </p:grpSpPr>
+      <p:sp>
+        <p:nvSpPr>
+          <p:cNvPr id="2" name="Titre 1"/>
+          <p:cNvSpPr>
+            <a:spLocks noGrp="1"/>
+          </p:cNvSpPr>
+          <p:nvPr>
+            <p:ph type="title"/>
+          </p:nvPr>
+        </p:nvSpPr>
+        <p:spPr/>
+        <p:txBody>
+          <a:bodyPr/>
+          <a:lstStyle/>
+          <a:p>
+            <a:r>
+              <a:rPr lang="fr-FR" u="sng" dirty="0" smtClean="0"/>
+              <a:t>Choix des paramètres</a:t>
+            </a:r>
+            <a:endParaRPr lang="fr-FR" u="sng" dirty="0"/>
           </a:p>
         </p:txBody>
       </p:sp>
@@ -10030,10 +10862,27 @@
         </p:nvSpPr>
         <p:spPr/>
         <p:txBody>
-          <a:bodyPr/>
-          <a:lstStyle/>
-          <a:p>
-            <a:endParaRPr lang="fr-FR" dirty="0"/>
+          <a:bodyPr vert="horz" lIns="91440" tIns="45720" rIns="91440" bIns="45720" rtlCol="0" anchor="t">
+            <a:normAutofit/>
+          </a:bodyPr>
+          <a:lstStyle/>
+          <a:p>
+            <a:r>
+              <a:rPr lang="fr-FR" dirty="0"/>
+              <a:t>K = 5</a:t>
+            </a:r>
+          </a:p>
+          <a:p>
+            <a:r>
+              <a:rPr lang="fr-FR" dirty="0"/>
+              <a:t>N = 10%</a:t>
+            </a:r>
+          </a:p>
+          <a:p>
+            <a:r>
+              <a:rPr lang="fr-FR" dirty="0"/>
+              <a:t>Nombre de colonnes sélectionnées =10</a:t>
+            </a:r>
           </a:p>
         </p:txBody>
       </p:sp>
@@ -10077,7 +10926,132 @@
           <a:p>
             <a:fld id="{AF2AB7E8-8710-491B-A675-D02618D68CCC}" type="slidenum">
               <a:rPr lang="fr-FR" smtClean="0"/>
-              <a:t>6</a:t>
+              <a:t>7</a:t>
+            </a:fld>
+            <a:endParaRPr lang="fr-FR"/>
+          </a:p>
+        </p:txBody>
+      </p:sp>
+    </p:spTree>
+    <p:extLst>
+      <p:ext uri="{BB962C8B-B14F-4D97-AF65-F5344CB8AC3E}">
+        <p14:creationId xmlns:p14="http://schemas.microsoft.com/office/powerpoint/2010/main" val="3939149527"/>
+      </p:ext>
+    </p:extLst>
+  </p:cSld>
+  <p:clrMapOvr>
+    <a:masterClrMapping/>
+  </p:clrMapOvr>
+  <p:timing>
+    <p:tnLst>
+      <p:par>
+        <p:cTn id="1" dur="indefinite" restart="never" nodeType="tmRoot"/>
+      </p:par>
+    </p:tnLst>
+  </p:timing>
+</p:sld>
+</file>
+
+<file path=ppt/slides/slide8.xml><?xml version="1.0" encoding="utf-8"?>
+<p:sld xmlns:a="http://schemas.openxmlformats.org/drawingml/2006/main" xmlns:r="http://schemas.openxmlformats.org/officeDocument/2006/relationships" xmlns:p="http://schemas.openxmlformats.org/presentationml/2006/main">
+  <p:cSld>
+    <p:spTree>
+      <p:nvGrpSpPr>
+        <p:cNvPr id="1" name=""/>
+        <p:cNvGrpSpPr/>
+        <p:nvPr/>
+      </p:nvGrpSpPr>
+      <p:grpSpPr>
+        <a:xfrm>
+          <a:off x="0" y="0"/>
+          <a:ext cx="0" cy="0"/>
+          <a:chOff x="0" y="0"/>
+          <a:chExt cx="0" cy="0"/>
+        </a:xfrm>
+      </p:grpSpPr>
+      <p:sp>
+        <p:nvSpPr>
+          <p:cNvPr id="2" name="Titre 1"/>
+          <p:cNvSpPr>
+            <a:spLocks noGrp="1"/>
+          </p:cNvSpPr>
+          <p:nvPr>
+            <p:ph type="title"/>
+          </p:nvPr>
+        </p:nvSpPr>
+        <p:spPr/>
+        <p:txBody>
+          <a:bodyPr/>
+          <a:lstStyle/>
+          <a:p>
+            <a:endParaRPr lang="fr-FR"/>
+          </a:p>
+        </p:txBody>
+      </p:sp>
+      <p:pic>
+        <p:nvPicPr>
+          <p:cNvPr id="6" name="Espace réservé du contenu 5"/>
+          <p:cNvPicPr>
+            <a:picLocks noGrp="1" noChangeAspect="1"/>
+          </p:cNvPicPr>
+          <p:nvPr>
+            <p:ph idx="1"/>
+          </p:nvPr>
+        </p:nvPicPr>
+        <p:blipFill>
+          <a:blip r:embed="rId3"/>
+          <a:stretch>
+            <a:fillRect/>
+          </a:stretch>
+        </p:blipFill>
+        <p:spPr>
+          <a:xfrm>
+            <a:off x="2651971" y="940585"/>
+            <a:ext cx="5456924" cy="5456923"/>
+          </a:xfrm>
+        </p:spPr>
+      </p:pic>
+      <p:sp>
+        <p:nvSpPr>
+          <p:cNvPr id="4" name="Espace réservé de la date 3"/>
+          <p:cNvSpPr>
+            <a:spLocks noGrp="1"/>
+          </p:cNvSpPr>
+          <p:nvPr>
+            <p:ph type="dt" sz="half" idx="10"/>
+          </p:nvPr>
+        </p:nvSpPr>
+        <p:spPr/>
+        <p:txBody>
+          <a:bodyPr/>
+          <a:lstStyle/>
+          <a:p>
+            <a:r>
+              <a:rPr lang="fr-FR" smtClean="0"/>
+              <a:t>24/04/2015</a:t>
+            </a:r>
+            <a:endParaRPr lang="fr-FR"/>
+          </a:p>
+        </p:txBody>
+      </p:sp>
+      <p:sp>
+        <p:nvSpPr>
+          <p:cNvPr id="5" name="Espace réservé du numéro de diapositive 4"/>
+          <p:cNvSpPr>
+            <a:spLocks noGrp="1"/>
+          </p:cNvSpPr>
+          <p:nvPr>
+            <p:ph type="sldNum" sz="quarter" idx="12"/>
+          </p:nvPr>
+        </p:nvSpPr>
+        <p:spPr/>
+        <p:txBody>
+          <a:bodyPr/>
+          <a:lstStyle/>
+          <a:p>
+            <a:fld id="{AF2AB7E8-8710-491B-A675-D02618D68CCC}" type="slidenum">
+              <a:rPr lang="fr-FR" smtClean="0"/>
+              <a:t>8</a:t>
             </a:fld>
             <a:endParaRPr lang="fr-FR"/>
           </a:p>

</xml_diff>